<commit_message>
Updated slide Chapter 6
</commit_message>
<xml_diff>
--- a/slides/Chapter 6.pptx
+++ b/slides/Chapter 6.pptx
@@ -9,8 +9,8 @@
     <p:sldId id="269" r:id="rId3"/>
     <p:sldId id="257" r:id="rId4"/>
     <p:sldId id="258" r:id="rId5"/>
-    <p:sldId id="259" r:id="rId6"/>
-    <p:sldId id="260" r:id="rId7"/>
+    <p:sldId id="260" r:id="rId6"/>
+    <p:sldId id="259" r:id="rId7"/>
     <p:sldId id="261" r:id="rId8"/>
     <p:sldId id="262" r:id="rId9"/>
     <p:sldId id="263" r:id="rId10"/>
@@ -31,6 +31,7 @@
     <p:sldId id="280" r:id="rId25"/>
     <p:sldId id="279" r:id="rId26"/>
     <p:sldId id="281" r:id="rId27"/>
+    <p:sldId id="282" r:id="rId28"/>
   </p:sldIdLst>
   <p:sldSz cx="12192000" cy="6858000"/>
   <p:notesSz cx="6858000" cy="9144000"/>
@@ -4893,13 +4894,8 @@
           <a:p>
             <a:r>
               <a:rPr lang="en-US" dirty="0"/>
-              <a:t>Humans perceive 7magnitudes of brightness difference and that’s not achievable by </a:t>
-            </a:r>
-            <a:r>
-              <a:rPr lang="en-US"/>
-              <a:t>most displays.</a:t>
-            </a:r>
-            <a:endParaRPr lang="en-US" dirty="0"/>
+              <a:t>Humans perceive 7magnitudes of brightness difference and that’s not achievable by most displays.</a:t>
+            </a:r>
           </a:p>
         </p:txBody>
       </p:sp>
@@ -4907,6 +4903,92 @@
     <p:extLst>
       <p:ext uri="{BB962C8B-B14F-4D97-AF65-F5344CB8AC3E}">
         <p14:creationId xmlns:p14="http://schemas.microsoft.com/office/powerpoint/2010/main" val="292704962"/>
+      </p:ext>
+    </p:extLst>
+  </p:cSld>
+  <p:clrMapOvr>
+    <a:masterClrMapping/>
+  </p:clrMapOvr>
+</p:sld>
+</file>
+
+<file path=ppt/slides/slide27.xml><?xml version="1.0" encoding="utf-8"?>
+<p:sld xmlns:a="http://schemas.openxmlformats.org/drawingml/2006/main" xmlns:r="http://schemas.openxmlformats.org/officeDocument/2006/relationships" xmlns:p="http://schemas.openxmlformats.org/presentationml/2006/main">
+  <p:cSld>
+    <p:spTree>
+      <p:nvGrpSpPr>
+        <p:cNvPr id="1" name=""/>
+        <p:cNvGrpSpPr/>
+        <p:nvPr/>
+      </p:nvGrpSpPr>
+      <p:grpSpPr>
+        <a:xfrm>
+          <a:off x="0" y="0"/>
+          <a:ext cx="0" cy="0"/>
+          <a:chOff x="0" y="0"/>
+          <a:chExt cx="0" cy="0"/>
+        </a:xfrm>
+      </p:grpSpPr>
+      <p:sp>
+        <p:nvSpPr>
+          <p:cNvPr id="2" name="Title 1">
+            <a:extLst>
+              <a:ext uri="{FF2B5EF4-FFF2-40B4-BE49-F238E27FC236}">
+                <a16:creationId xmlns:a16="http://schemas.microsoft.com/office/drawing/2014/main" id="{87A47D4A-0DBC-401E-924A-89DA2D8F4609}"/>
+              </a:ext>
+            </a:extLst>
+          </p:cNvPr>
+          <p:cNvSpPr>
+            <a:spLocks noGrp="1"/>
+          </p:cNvSpPr>
+          <p:nvPr>
+            <p:ph type="title"/>
+          </p:nvPr>
+        </p:nvSpPr>
+        <p:spPr/>
+        <p:txBody>
+          <a:bodyPr/>
+          <a:lstStyle/>
+          <a:p>
+            <a:r>
+              <a:rPr lang="en-US" dirty="0"/>
+              <a:t>Combining sources of information</a:t>
+            </a:r>
+          </a:p>
+        </p:txBody>
+      </p:sp>
+      <p:sp>
+        <p:nvSpPr>
+          <p:cNvPr id="3" name="Content Placeholder 2">
+            <a:extLst>
+              <a:ext uri="{FF2B5EF4-FFF2-40B4-BE49-F238E27FC236}">
+                <a16:creationId xmlns:a16="http://schemas.microsoft.com/office/drawing/2014/main" id="{A7E4453F-A66E-497F-8C44-5993740FDA04}"/>
+              </a:ext>
+            </a:extLst>
+          </p:cNvPr>
+          <p:cNvSpPr>
+            <a:spLocks noGrp="1"/>
+          </p:cNvSpPr>
+          <p:nvPr>
+            <p:ph idx="1"/>
+          </p:nvPr>
+        </p:nvSpPr>
+        <p:spPr/>
+        <p:txBody>
+          <a:bodyPr/>
+          <a:lstStyle/>
+          <a:p>
+            <a:r>
+              <a:rPr lang="en-US" dirty="0"/>
+              <a:t>Using probability to determine the truth based on multiple inputs </a:t>
+            </a:r>
+          </a:p>
+        </p:txBody>
+      </p:sp>
+    </p:spTree>
+    <p:extLst>
+      <p:ext uri="{BB962C8B-B14F-4D97-AF65-F5344CB8AC3E}">
+        <p14:creationId xmlns:p14="http://schemas.microsoft.com/office/powerpoint/2010/main" val="594467791"/>
       </p:ext>
     </p:extLst>
   </p:cSld>
@@ -5143,6 +5225,104 @@
           <p:cNvPr id="2" name="Title 1">
             <a:extLst>
               <a:ext uri="{FF2B5EF4-FFF2-40B4-BE49-F238E27FC236}">
+                <a16:creationId xmlns:a16="http://schemas.microsoft.com/office/drawing/2014/main" id="{E75DE818-2EB6-4D38-BBB5-3DB3E78ADAE6}"/>
+              </a:ext>
+            </a:extLst>
+          </p:cNvPr>
+          <p:cNvSpPr>
+            <a:spLocks noGrp="1"/>
+          </p:cNvSpPr>
+          <p:nvPr>
+            <p:ph type="title"/>
+          </p:nvPr>
+        </p:nvSpPr>
+        <p:spPr/>
+        <p:txBody>
+          <a:bodyPr/>
+          <a:lstStyle/>
+          <a:p>
+            <a:r>
+              <a:rPr lang="en-US" dirty="0"/>
+              <a:t>Monocular perception</a:t>
+            </a:r>
+          </a:p>
+        </p:txBody>
+      </p:sp>
+      <p:sp>
+        <p:nvSpPr>
+          <p:cNvPr id="3" name="Content Placeholder 2">
+            <a:extLst>
+              <a:ext uri="{FF2B5EF4-FFF2-40B4-BE49-F238E27FC236}">
+                <a16:creationId xmlns:a16="http://schemas.microsoft.com/office/drawing/2014/main" id="{467A66D3-EA75-4F89-8B32-A4DFF6BB873B}"/>
+              </a:ext>
+            </a:extLst>
+          </p:cNvPr>
+          <p:cNvSpPr>
+            <a:spLocks noGrp="1"/>
+          </p:cNvSpPr>
+          <p:nvPr>
+            <p:ph idx="1"/>
+          </p:nvPr>
+        </p:nvSpPr>
+        <p:spPr/>
+        <p:txBody>
+          <a:bodyPr/>
+          <a:lstStyle/>
+          <a:p>
+            <a:r>
+              <a:rPr lang="en-US" dirty="0"/>
+              <a:t>In principal it works by comparing relative objects visible size based on some known or assumed size</a:t>
+            </a:r>
+          </a:p>
+          <a:p>
+            <a:r>
+              <a:rPr lang="en-US" dirty="0"/>
+              <a:t>The closer an object the larger it is on the retina</a:t>
+            </a:r>
+          </a:p>
+          <a:p>
+            <a:r>
+              <a:rPr lang="en-US" dirty="0"/>
+              <a:t>Shape and texture are additional cues</a:t>
+            </a:r>
+          </a:p>
+        </p:txBody>
+      </p:sp>
+    </p:spTree>
+    <p:extLst>
+      <p:ext uri="{BB962C8B-B14F-4D97-AF65-F5344CB8AC3E}">
+        <p14:creationId xmlns:p14="http://schemas.microsoft.com/office/powerpoint/2010/main" val="1588635007"/>
+      </p:ext>
+    </p:extLst>
+  </p:cSld>
+  <p:clrMapOvr>
+    <a:masterClrMapping/>
+  </p:clrMapOvr>
+</p:sld>
+</file>
+
+<file path=ppt/slides/slide6.xml><?xml version="1.0" encoding="utf-8"?>
+<p:sld xmlns:a="http://schemas.openxmlformats.org/drawingml/2006/main" xmlns:r="http://schemas.openxmlformats.org/officeDocument/2006/relationships" xmlns:p="http://schemas.openxmlformats.org/presentationml/2006/main">
+  <p:cSld>
+    <p:spTree>
+      <p:nvGrpSpPr>
+        <p:cNvPr id="1" name=""/>
+        <p:cNvGrpSpPr/>
+        <p:nvPr/>
+      </p:nvGrpSpPr>
+      <p:grpSpPr>
+        <a:xfrm>
+          <a:off x="0" y="0"/>
+          <a:ext cx="0" cy="0"/>
+          <a:chOff x="0" y="0"/>
+          <a:chExt cx="0" cy="0"/>
+        </a:xfrm>
+      </p:grpSpPr>
+      <p:sp>
+        <p:nvSpPr>
+          <p:cNvPr id="2" name="Title 1">
+            <a:extLst>
+              <a:ext uri="{FF2B5EF4-FFF2-40B4-BE49-F238E27FC236}">
                 <a16:creationId xmlns:a16="http://schemas.microsoft.com/office/drawing/2014/main" id="{BE77DA42-6DE8-4B05-BC91-4B55E66154B2}"/>
               </a:ext>
             </a:extLst>
@@ -5225,104 +5405,6 @@
     <p:extLst>
       <p:ext uri="{BB962C8B-B14F-4D97-AF65-F5344CB8AC3E}">
         <p14:creationId xmlns:p14="http://schemas.microsoft.com/office/powerpoint/2010/main" val="1491145721"/>
-      </p:ext>
-    </p:extLst>
-  </p:cSld>
-  <p:clrMapOvr>
-    <a:masterClrMapping/>
-  </p:clrMapOvr>
-</p:sld>
-</file>
-
-<file path=ppt/slides/slide6.xml><?xml version="1.0" encoding="utf-8"?>
-<p:sld xmlns:a="http://schemas.openxmlformats.org/drawingml/2006/main" xmlns:r="http://schemas.openxmlformats.org/officeDocument/2006/relationships" xmlns:p="http://schemas.openxmlformats.org/presentationml/2006/main">
-  <p:cSld>
-    <p:spTree>
-      <p:nvGrpSpPr>
-        <p:cNvPr id="1" name=""/>
-        <p:cNvGrpSpPr/>
-        <p:nvPr/>
-      </p:nvGrpSpPr>
-      <p:grpSpPr>
-        <a:xfrm>
-          <a:off x="0" y="0"/>
-          <a:ext cx="0" cy="0"/>
-          <a:chOff x="0" y="0"/>
-          <a:chExt cx="0" cy="0"/>
-        </a:xfrm>
-      </p:grpSpPr>
-      <p:sp>
-        <p:nvSpPr>
-          <p:cNvPr id="2" name="Title 1">
-            <a:extLst>
-              <a:ext uri="{FF2B5EF4-FFF2-40B4-BE49-F238E27FC236}">
-                <a16:creationId xmlns:a16="http://schemas.microsoft.com/office/drawing/2014/main" id="{E75DE818-2EB6-4D38-BBB5-3DB3E78ADAE6}"/>
-              </a:ext>
-            </a:extLst>
-          </p:cNvPr>
-          <p:cNvSpPr>
-            <a:spLocks noGrp="1"/>
-          </p:cNvSpPr>
-          <p:nvPr>
-            <p:ph type="title"/>
-          </p:nvPr>
-        </p:nvSpPr>
-        <p:spPr/>
-        <p:txBody>
-          <a:bodyPr/>
-          <a:lstStyle/>
-          <a:p>
-            <a:r>
-              <a:rPr lang="en-US" dirty="0"/>
-              <a:t>Monocular perception</a:t>
-            </a:r>
-          </a:p>
-        </p:txBody>
-      </p:sp>
-      <p:sp>
-        <p:nvSpPr>
-          <p:cNvPr id="3" name="Content Placeholder 2">
-            <a:extLst>
-              <a:ext uri="{FF2B5EF4-FFF2-40B4-BE49-F238E27FC236}">
-                <a16:creationId xmlns:a16="http://schemas.microsoft.com/office/drawing/2014/main" id="{467A66D3-EA75-4F89-8B32-A4DFF6BB873B}"/>
-              </a:ext>
-            </a:extLst>
-          </p:cNvPr>
-          <p:cNvSpPr>
-            <a:spLocks noGrp="1"/>
-          </p:cNvSpPr>
-          <p:nvPr>
-            <p:ph idx="1"/>
-          </p:nvPr>
-        </p:nvSpPr>
-        <p:spPr/>
-        <p:txBody>
-          <a:bodyPr/>
-          <a:lstStyle/>
-          <a:p>
-            <a:r>
-              <a:rPr lang="en-US" dirty="0"/>
-              <a:t>In principal it works by comparing relative objects visible size based on some known or assumed size</a:t>
-            </a:r>
-          </a:p>
-          <a:p>
-            <a:r>
-              <a:rPr lang="en-US" dirty="0"/>
-              <a:t>The closer an object the larger it is on the retina</a:t>
-            </a:r>
-          </a:p>
-          <a:p>
-            <a:r>
-              <a:rPr lang="en-US" dirty="0"/>
-              <a:t>Shape and texture can be </a:t>
-            </a:r>
-          </a:p>
-        </p:txBody>
-      </p:sp>
-    </p:spTree>
-    <p:extLst>
-      <p:ext uri="{BB962C8B-B14F-4D97-AF65-F5344CB8AC3E}">
-        <p14:creationId xmlns:p14="http://schemas.microsoft.com/office/powerpoint/2010/main" val="1588635007"/>
       </p:ext>
     </p:extLst>
   </p:cSld>

</xml_diff>